<commit_message>
Add Jesus mau den
Signed-off-by: Jin Nguyen <dangtrinhnt@mymusictaste.com>
</commit_message>
<xml_diff>
--- a/TC/020 - Ngợi Khen Đấng Quân Lâm Muôn Đời.pptx
+++ b/TC/020 - Ngợi Khen Đấng Quân Lâm Muôn Đời.pptx
@@ -182,10 +182,9 @@
           </a:lstStyle>
           <a:p>
             <a:r>
-              <a:rPr lang="en-US" smtClean="0"/>
+              <a:rPr lang="en-US"/>
               <a:t>Click to edit Master title style</a:t>
             </a:r>
-            <a:endParaRPr lang="en-US"/>
           </a:p>
         </p:txBody>
       </p:sp>
@@ -247,10 +246,9 @@
           </a:lstStyle>
           <a:p>
             <a:r>
-              <a:rPr lang="en-US" smtClean="0"/>
+              <a:rPr lang="en-US"/>
               <a:t>Click to edit Master subtitle style</a:t>
             </a:r>
-            <a:endParaRPr lang="en-US"/>
           </a:p>
         </p:txBody>
       </p:sp>
@@ -271,7 +269,7 @@
           <a:p>
             <a:fld id="{21EE17E9-7ACD-4AD4-8D41-070106C7D3E3}" type="datetimeFigureOut">
               <a:rPr lang="en-US" smtClean="0"/>
-              <a:t>18/11/2013</a:t>
+              <a:t>8/17/19</a:t>
             </a:fld>
             <a:endParaRPr lang="en-US"/>
           </a:p>
@@ -374,10 +372,9 @@
           </a:lstStyle>
           <a:p>
             <a:r>
-              <a:rPr lang="en-US" smtClean="0"/>
+              <a:rPr lang="en-US"/>
               <a:t>Click to edit Master title style</a:t>
             </a:r>
-            <a:endParaRPr lang="en-US"/>
           </a:p>
         </p:txBody>
       </p:sp>
@@ -439,10 +436,9 @@
           </a:lstStyle>
           <a:p>
             <a:r>
-              <a:rPr lang="en-US" smtClean="0"/>
+              <a:rPr lang="en-US"/>
               <a:t>Click to edit Master subtitle style</a:t>
             </a:r>
-            <a:endParaRPr lang="en-US"/>
           </a:p>
         </p:txBody>
       </p:sp>
@@ -463,7 +459,7 @@
           <a:p>
             <a:fld id="{21EE17E9-7ACD-4AD4-8D41-070106C7D3E3}" type="datetimeFigureOut">
               <a:rPr lang="en-US" smtClean="0"/>
-              <a:t>18/11/2013</a:t>
+              <a:t>8/17/19</a:t>
             </a:fld>
             <a:endParaRPr lang="en-US"/>
           </a:p>
@@ -581,10 +577,9 @@
           <a:lstStyle/>
           <a:p>
             <a:r>
-              <a:rPr lang="en-US" smtClean="0"/>
+              <a:rPr lang="en-US"/>
               <a:t>Click to edit Master title style</a:t>
             </a:r>
-            <a:endParaRPr lang="en-US"/>
           </a:p>
         </p:txBody>
       </p:sp>
@@ -615,38 +610,37 @@
           <a:p>
             <a:pPr lvl="0"/>
             <a:r>
-              <a:rPr lang="en-US" smtClean="0"/>
+              <a:rPr lang="en-US"/>
               <a:t>Click to edit Master text styles</a:t>
             </a:r>
           </a:p>
           <a:p>
             <a:pPr lvl="1"/>
             <a:r>
-              <a:rPr lang="en-US" smtClean="0"/>
+              <a:rPr lang="en-US"/>
               <a:t>Second level</a:t>
             </a:r>
           </a:p>
           <a:p>
             <a:pPr lvl="2"/>
             <a:r>
-              <a:rPr lang="en-US" smtClean="0"/>
+              <a:rPr lang="en-US"/>
               <a:t>Third level</a:t>
             </a:r>
           </a:p>
           <a:p>
             <a:pPr lvl="3"/>
             <a:r>
-              <a:rPr lang="en-US" smtClean="0"/>
+              <a:rPr lang="en-US"/>
               <a:t>Fourth level</a:t>
             </a:r>
           </a:p>
           <a:p>
             <a:pPr lvl="4"/>
             <a:r>
-              <a:rPr lang="en-US" smtClean="0"/>
+              <a:rPr lang="en-US"/>
               <a:t>Fifth level</a:t>
             </a:r>
-            <a:endParaRPr lang="en-US"/>
           </a:p>
         </p:txBody>
       </p:sp>
@@ -685,7 +679,7 @@
           <a:p>
             <a:fld id="{21EE17E9-7ACD-4AD4-8D41-070106C7D3E3}" type="datetimeFigureOut">
               <a:rPr lang="en-US" smtClean="0"/>
-              <a:t>18/11/2013</a:t>
+              <a:t>8/17/19</a:t>
             </a:fld>
             <a:endParaRPr lang="en-US"/>
           </a:p>
@@ -1120,10 +1114,9 @@
           <a:lstStyle/>
           <a:p>
             <a:r>
-              <a:rPr lang="en-US" smtClean="0"/>
+              <a:rPr lang="en-US"/>
               <a:t>Click to edit Master title style</a:t>
             </a:r>
-            <a:endParaRPr lang="en-US"/>
           </a:p>
         </p:txBody>
       </p:sp>
@@ -1154,38 +1147,37 @@
           <a:p>
             <a:pPr lvl="0"/>
             <a:r>
-              <a:rPr lang="en-US" smtClean="0"/>
+              <a:rPr lang="en-US"/>
               <a:t>Click to edit Master text styles</a:t>
             </a:r>
           </a:p>
           <a:p>
             <a:pPr lvl="1"/>
             <a:r>
-              <a:rPr lang="en-US" smtClean="0"/>
+              <a:rPr lang="en-US"/>
               <a:t>Second level</a:t>
             </a:r>
           </a:p>
           <a:p>
             <a:pPr lvl="2"/>
             <a:r>
-              <a:rPr lang="en-US" smtClean="0"/>
+              <a:rPr lang="en-US"/>
               <a:t>Third level</a:t>
             </a:r>
           </a:p>
           <a:p>
             <a:pPr lvl="3"/>
             <a:r>
-              <a:rPr lang="en-US" smtClean="0"/>
+              <a:rPr lang="en-US"/>
               <a:t>Fourth level</a:t>
             </a:r>
           </a:p>
           <a:p>
             <a:pPr lvl="4"/>
             <a:r>
-              <a:rPr lang="en-US" smtClean="0"/>
+              <a:rPr lang="en-US"/>
               <a:t>Fifth level</a:t>
             </a:r>
-            <a:endParaRPr lang="en-US"/>
           </a:p>
         </p:txBody>
       </p:sp>
@@ -1224,7 +1216,7 @@
           <a:p>
             <a:fld id="{21EE17E9-7ACD-4AD4-8D41-070106C7D3E3}" type="datetimeFigureOut">
               <a:rPr lang="en-US" smtClean="0"/>
-              <a:t>18/11/2013</a:t>
+              <a:t>8/17/19</a:t>
             </a:fld>
             <a:endParaRPr lang="en-US"/>
           </a:p>
@@ -1659,14 +1651,14 @@
           </a:lstStyle>
           <a:p>
             <a:r>
-              <a:rPr lang="en-US" sz="7200"/>
+              <a:rPr lang="en-US" sz="7200" dirty="0"/>
               <a:t>NGÔÏI KHEN</a:t>
             </a:r>
             <a:br>
-              <a:rPr lang="en-US" sz="7200"/>
+              <a:rPr lang="en-US" sz="7200" dirty="0"/>
             </a:br>
             <a:r>
-              <a:rPr lang="en-US" sz="7200"/>
+              <a:rPr lang="en-US" sz="7200" dirty="0"/>
               <a:t>ÑAÁNG QUAÂN LAÂM MUOÂN ÑÔØI</a:t>
             </a:r>
           </a:p>
@@ -1709,7 +1701,7 @@
           </a:lstStyle>
           <a:p>
             <a:r>
-              <a:rPr lang="en-US"/>
+              <a:rPr lang="en-US" dirty="0"/>
               <a:t>TOÂN VINH CHUÙA – THAÙNH CA 20</a:t>
             </a:r>
           </a:p>
@@ -1725,25 +1717,18 @@
   <p:clrMapOvr>
     <a:masterClrMapping/>
   </p:clrMapOvr>
-  <mc:AlternateContent xmlns:mc="http://schemas.openxmlformats.org/markup-compatibility/2006">
-    <mc:Choice xmlns:p14="http://schemas.microsoft.com/office/powerpoint/2010/main" Requires="p14">
+  <mc:AlternateContent xmlns:mc="http://schemas.openxmlformats.org/markup-compatibility/2006" xmlns:p14="http://schemas.microsoft.com/office/powerpoint/2010/main">
+    <mc:Choice Requires="p14">
       <p:transition spd="slow" p14:dur="800">
         <p:circle/>
       </p:transition>
     </mc:Choice>
-    <mc:Fallback>
+    <mc:Fallback xmlns="">
       <p:transition spd="slow">
         <p:circle/>
       </p:transition>
     </mc:Fallback>
   </mc:AlternateContent>
-  <p:timing>
-    <p:tnLst>
-      <p:par>
-        <p:cTn id="1" dur="indefinite" restart="never" nodeType="tmRoot"/>
-      </p:par>
-    </p:tnLst>
-  </p:timing>
 </p:sld>
 </file>
 
@@ -1831,56 +1816,6 @@
             <a:r>
               <a:rPr lang="en-US"/>
               <a:t>hoàn linh.</a:t>
-            </a:r>
-          </a:p>
-        </p:txBody>
-      </p:sp>
-      <p:sp>
-        <p:nvSpPr>
-          <p:cNvPr id="6" name="Title 1"/>
-          <p:cNvSpPr txBox="1">
-            <a:spLocks/>
-          </p:cNvSpPr>
-          <p:nvPr/>
-        </p:nvSpPr>
-        <p:spPr>
-          <a:xfrm>
-            <a:off x="0" y="5943600"/>
-            <a:ext cx="9144000" cy="685800"/>
-          </a:xfrm>
-          <a:prstGeom prst="rect">
-            <a:avLst/>
-          </a:prstGeom>
-        </p:spPr>
-        <p:txBody>
-          <a:bodyPr vert="horz" lIns="91440" tIns="45720" rIns="91440" bIns="45720" rtlCol="0" anchor="ctr">
-            <a:noAutofit/>
-          </a:bodyPr>
-          <a:lstStyle>
-            <a:defPPr>
-              <a:defRPr lang="en-US"/>
-            </a:defPPr>
-            <a:lvl1pPr algn="ctr">
-              <a:spcBef>
-                <a:spcPct val="0"/>
-              </a:spcBef>
-              <a:defRPr sz="3600" b="1" spc="-150">
-                <a:solidFill>
-                  <a:srgbClr val="C00000"/>
-                </a:solidFill>
-                <a:effectLst>
-                  <a:glow rad="127000">
-                    <a:prstClr val="white"/>
-                  </a:glow>
-                </a:effectLst>
-                <a:latin typeface="HP-Amazone" panose="020B0603050302020204" pitchFamily="34" charset="0"/>
-              </a:defRPr>
-            </a:lvl1pPr>
-          </a:lstStyle>
-          <a:p>
-            <a:r>
-              <a:rPr lang="en-US"/>
-              <a:t>Tc 20 – Ngôïi Khen Ñaáng Quaân Laâm Muoân Ñôøi</a:t>
             </a:r>
           </a:p>
         </p:txBody>
@@ -1907,13 +1842,6 @@
       </p:transition>
     </mc:Fallback>
   </mc:AlternateContent>
-  <p:timing>
-    <p:tnLst>
-      <p:par>
-        <p:cTn id="1" dur="indefinite" restart="never" nodeType="tmRoot"/>
-      </p:par>
-    </p:tnLst>
-  </p:timing>
 </p:sld>
 </file>
 
@@ -2001,56 +1929,6 @@
           </a:p>
         </p:txBody>
       </p:sp>
-      <p:sp>
-        <p:nvSpPr>
-          <p:cNvPr id="6" name="Title 1"/>
-          <p:cNvSpPr txBox="1">
-            <a:spLocks/>
-          </p:cNvSpPr>
-          <p:nvPr/>
-        </p:nvSpPr>
-        <p:spPr>
-          <a:xfrm>
-            <a:off x="0" y="5943600"/>
-            <a:ext cx="9144000" cy="685800"/>
-          </a:xfrm>
-          <a:prstGeom prst="rect">
-            <a:avLst/>
-          </a:prstGeom>
-        </p:spPr>
-        <p:txBody>
-          <a:bodyPr vert="horz" lIns="91440" tIns="45720" rIns="91440" bIns="45720" rtlCol="0" anchor="ctr">
-            <a:noAutofit/>
-          </a:bodyPr>
-          <a:lstStyle>
-            <a:defPPr>
-              <a:defRPr lang="en-US"/>
-            </a:defPPr>
-            <a:lvl1pPr algn="ctr">
-              <a:spcBef>
-                <a:spcPct val="0"/>
-              </a:spcBef>
-              <a:defRPr sz="3600" b="1" spc="-150">
-                <a:solidFill>
-                  <a:srgbClr val="C00000"/>
-                </a:solidFill>
-                <a:effectLst>
-                  <a:glow rad="127000">
-                    <a:prstClr val="white"/>
-                  </a:glow>
-                </a:effectLst>
-                <a:latin typeface="HP-Amazone" panose="020B0603050302020204" pitchFamily="34" charset="0"/>
-              </a:defRPr>
-            </a:lvl1pPr>
-          </a:lstStyle>
-          <a:p>
-            <a:r>
-              <a:rPr lang="en-US"/>
-              <a:t>Tc 20 – Ngôïi Khen Ñaáng Quaân Laâm Muoân Ñôøi</a:t>
-            </a:r>
-          </a:p>
-        </p:txBody>
-      </p:sp>
     </p:spTree>
     <p:extLst>
       <p:ext uri="{BB962C8B-B14F-4D97-AF65-F5344CB8AC3E}">
@@ -2061,21 +1939,6 @@
   <p:clrMapOvr>
     <a:masterClrMapping/>
   </p:clrMapOvr>
-  <mc:AlternateContent xmlns:mc="http://schemas.openxmlformats.org/markup-compatibility/2006" xmlns:p14="http://schemas.microsoft.com/office/powerpoint/2010/main">
-    <mc:Choice Requires="p14">
-      <p:transition p14:dur="0"/>
-    </mc:Choice>
-    <mc:Fallback xmlns="">
-      <p:transition/>
-    </mc:Fallback>
-  </mc:AlternateContent>
-  <p:timing>
-    <p:tnLst>
-      <p:par>
-        <p:cTn id="1" dur="indefinite" restart="never" nodeType="tmRoot"/>
-      </p:par>
-    </p:tnLst>
-  </p:timing>
 </p:sld>
 </file>
 
@@ -2141,65 +2004,7 @@
             </a:r>
             <a:r>
               <a:rPr lang="en-US"/>
-              <a:t> Ñoàng ngôïi danh Jeâsus, toân kính danh Jeâsus, ñoàng ngôïi khen danh </a:t>
-            </a:r>
-            <a:r>
-              <a:rPr lang="en-US" smtClean="0"/>
-              <a:t>Cöùu </a:t>
-            </a:r>
-            <a:r>
-              <a:rPr lang="en-US"/>
-              <a:t>Chuùa Jeâsus.</a:t>
-            </a:r>
-          </a:p>
-        </p:txBody>
-      </p:sp>
-      <p:sp>
-        <p:nvSpPr>
-          <p:cNvPr id="6" name="Title 1"/>
-          <p:cNvSpPr txBox="1">
-            <a:spLocks/>
-          </p:cNvSpPr>
-          <p:nvPr/>
-        </p:nvSpPr>
-        <p:spPr>
-          <a:xfrm>
-            <a:off x="0" y="5943600"/>
-            <a:ext cx="9144000" cy="685800"/>
-          </a:xfrm>
-          <a:prstGeom prst="rect">
-            <a:avLst/>
-          </a:prstGeom>
-        </p:spPr>
-        <p:txBody>
-          <a:bodyPr vert="horz" lIns="91440" tIns="45720" rIns="91440" bIns="45720" rtlCol="0" anchor="ctr">
-            <a:noAutofit/>
-          </a:bodyPr>
-          <a:lstStyle>
-            <a:defPPr>
-              <a:defRPr lang="en-US"/>
-            </a:defPPr>
-            <a:lvl1pPr algn="ctr">
-              <a:spcBef>
-                <a:spcPct val="0"/>
-              </a:spcBef>
-              <a:defRPr sz="3600" b="1" spc="-150">
-                <a:solidFill>
-                  <a:srgbClr val="C00000"/>
-                </a:solidFill>
-                <a:effectLst>
-                  <a:glow rad="127000">
-                    <a:prstClr val="white"/>
-                  </a:glow>
-                </a:effectLst>
-                <a:latin typeface="HP-Amazone" panose="020B0603050302020204" pitchFamily="34" charset="0"/>
-              </a:defRPr>
-            </a:lvl1pPr>
-          </a:lstStyle>
-          <a:p>
-            <a:r>
-              <a:rPr lang="en-US"/>
-              <a:t>Tc 20 – Ngôïi Khen Ñaáng Quaân Laâm Muoân Ñôøi</a:t>
+              <a:t> Ñoàng ngôïi danh Jeâsus, toân kính danh Jeâsus, ñoàng ngôïi khen danh Cöùu Chuùa Jeâsus.</a:t>
             </a:r>
           </a:p>
         </p:txBody>
@@ -2214,21 +2019,6 @@
   <p:clrMapOvr>
     <a:masterClrMapping/>
   </p:clrMapOvr>
-  <mc:AlternateContent xmlns:mc="http://schemas.openxmlformats.org/markup-compatibility/2006" xmlns:p14="http://schemas.microsoft.com/office/powerpoint/2010/main">
-    <mc:Choice Requires="p14">
-      <p:transition p14:dur="0"/>
-    </mc:Choice>
-    <mc:Fallback xmlns="">
-      <p:transition/>
-    </mc:Fallback>
-  </mc:AlternateContent>
-  <p:timing>
-    <p:tnLst>
-      <p:par>
-        <p:cTn id="1" dur="indefinite" restart="never" nodeType="tmRoot"/>
-      </p:par>
-    </p:tnLst>
-  </p:timing>
 </p:sld>
 </file>
 
@@ -2302,56 +2092,6 @@
           </a:p>
         </p:txBody>
       </p:sp>
-      <p:sp>
-        <p:nvSpPr>
-          <p:cNvPr id="6" name="Title 1"/>
-          <p:cNvSpPr txBox="1">
-            <a:spLocks/>
-          </p:cNvSpPr>
-          <p:nvPr/>
-        </p:nvSpPr>
-        <p:spPr>
-          <a:xfrm>
-            <a:off x="0" y="5943600"/>
-            <a:ext cx="9144000" cy="685800"/>
-          </a:xfrm>
-          <a:prstGeom prst="rect">
-            <a:avLst/>
-          </a:prstGeom>
-        </p:spPr>
-        <p:txBody>
-          <a:bodyPr vert="horz" lIns="91440" tIns="45720" rIns="91440" bIns="45720" rtlCol="0" anchor="ctr">
-            <a:noAutofit/>
-          </a:bodyPr>
-          <a:lstStyle>
-            <a:defPPr>
-              <a:defRPr lang="en-US"/>
-            </a:defPPr>
-            <a:lvl1pPr algn="ctr">
-              <a:spcBef>
-                <a:spcPct val="0"/>
-              </a:spcBef>
-              <a:defRPr sz="3600" b="1" spc="-150">
-                <a:solidFill>
-                  <a:srgbClr val="C00000"/>
-                </a:solidFill>
-                <a:effectLst>
-                  <a:glow rad="127000">
-                    <a:prstClr val="white"/>
-                  </a:glow>
-                </a:effectLst>
-                <a:latin typeface="HP-Amazone" panose="020B0603050302020204" pitchFamily="34" charset="0"/>
-              </a:defRPr>
-            </a:lvl1pPr>
-          </a:lstStyle>
-          <a:p>
-            <a:r>
-              <a:rPr lang="en-US"/>
-              <a:t>Tc 20 – Ngôïi Khen Ñaáng Quaân Laâm Muoân Ñôøi</a:t>
-            </a:r>
-          </a:p>
-        </p:txBody>
-      </p:sp>
     </p:spTree>
     <p:extLst>
       <p:ext uri="{BB962C8B-B14F-4D97-AF65-F5344CB8AC3E}">
@@ -2362,21 +2102,6 @@
   <p:clrMapOvr>
     <a:masterClrMapping/>
   </p:clrMapOvr>
-  <mc:AlternateContent xmlns:mc="http://schemas.openxmlformats.org/markup-compatibility/2006" xmlns:p14="http://schemas.microsoft.com/office/powerpoint/2010/main">
-    <mc:Choice Requires="p14">
-      <p:transition p14:dur="0"/>
-    </mc:Choice>
-    <mc:Fallback xmlns="">
-      <p:transition/>
-    </mc:Fallback>
-  </mc:AlternateContent>
-  <p:timing>
-    <p:tnLst>
-      <p:par>
-        <p:cTn id="1" dur="indefinite" restart="never" nodeType="tmRoot"/>
-      </p:par>
-    </p:tnLst>
-  </p:timing>
 </p:sld>
 </file>
 
@@ -2468,56 +2193,6 @@
           </a:p>
         </p:txBody>
       </p:sp>
-      <p:sp>
-        <p:nvSpPr>
-          <p:cNvPr id="6" name="Title 1"/>
-          <p:cNvSpPr txBox="1">
-            <a:spLocks/>
-          </p:cNvSpPr>
-          <p:nvPr/>
-        </p:nvSpPr>
-        <p:spPr>
-          <a:xfrm>
-            <a:off x="0" y="5943600"/>
-            <a:ext cx="9144000" cy="685800"/>
-          </a:xfrm>
-          <a:prstGeom prst="rect">
-            <a:avLst/>
-          </a:prstGeom>
-        </p:spPr>
-        <p:txBody>
-          <a:bodyPr vert="horz" lIns="91440" tIns="45720" rIns="91440" bIns="45720" rtlCol="0" anchor="ctr">
-            <a:noAutofit/>
-          </a:bodyPr>
-          <a:lstStyle>
-            <a:defPPr>
-              <a:defRPr lang="en-US"/>
-            </a:defPPr>
-            <a:lvl1pPr algn="ctr">
-              <a:spcBef>
-                <a:spcPct val="0"/>
-              </a:spcBef>
-              <a:defRPr sz="3600" b="1" spc="-150">
-                <a:solidFill>
-                  <a:srgbClr val="C00000"/>
-                </a:solidFill>
-                <a:effectLst>
-                  <a:glow rad="127000">
-                    <a:prstClr val="white"/>
-                  </a:glow>
-                </a:effectLst>
-                <a:latin typeface="HP-Amazone" panose="020B0603050302020204" pitchFamily="34" charset="0"/>
-              </a:defRPr>
-            </a:lvl1pPr>
-          </a:lstStyle>
-          <a:p>
-            <a:r>
-              <a:rPr lang="en-US"/>
-              <a:t>Tc 20 – Ngôïi Khen Ñaáng Quaân Laâm Muoân Ñôøi</a:t>
-            </a:r>
-          </a:p>
-        </p:txBody>
-      </p:sp>
     </p:spTree>
     <p:extLst>
       <p:ext uri="{BB962C8B-B14F-4D97-AF65-F5344CB8AC3E}">
@@ -2528,21 +2203,6 @@
   <p:clrMapOvr>
     <a:masterClrMapping/>
   </p:clrMapOvr>
-  <mc:AlternateContent xmlns:mc="http://schemas.openxmlformats.org/markup-compatibility/2006" xmlns:p14="http://schemas.microsoft.com/office/powerpoint/2010/main">
-    <mc:Choice Requires="p14">
-      <p:transition p14:dur="0"/>
-    </mc:Choice>
-    <mc:Fallback xmlns="">
-      <p:transition/>
-    </mc:Fallback>
-  </mc:AlternateContent>
-  <p:timing>
-    <p:tnLst>
-      <p:par>
-        <p:cTn id="1" dur="indefinite" restart="never" nodeType="tmRoot"/>
-      </p:par>
-    </p:tnLst>
-  </p:timing>
 </p:sld>
 </file>
 
@@ -2623,56 +2283,6 @@
           </a:p>
         </p:txBody>
       </p:sp>
-      <p:sp>
-        <p:nvSpPr>
-          <p:cNvPr id="6" name="Title 1"/>
-          <p:cNvSpPr txBox="1">
-            <a:spLocks/>
-          </p:cNvSpPr>
-          <p:nvPr/>
-        </p:nvSpPr>
-        <p:spPr>
-          <a:xfrm>
-            <a:off x="0" y="5943600"/>
-            <a:ext cx="9144000" cy="685800"/>
-          </a:xfrm>
-          <a:prstGeom prst="rect">
-            <a:avLst/>
-          </a:prstGeom>
-        </p:spPr>
-        <p:txBody>
-          <a:bodyPr vert="horz" lIns="91440" tIns="45720" rIns="91440" bIns="45720" rtlCol="0" anchor="ctr">
-            <a:noAutofit/>
-          </a:bodyPr>
-          <a:lstStyle>
-            <a:defPPr>
-              <a:defRPr lang="en-US"/>
-            </a:defPPr>
-            <a:lvl1pPr algn="ctr">
-              <a:spcBef>
-                <a:spcPct val="0"/>
-              </a:spcBef>
-              <a:defRPr sz="3600" b="1" spc="-150">
-                <a:solidFill>
-                  <a:srgbClr val="C00000"/>
-                </a:solidFill>
-                <a:effectLst>
-                  <a:glow rad="127000">
-                    <a:prstClr val="white"/>
-                  </a:glow>
-                </a:effectLst>
-                <a:latin typeface="HP-Amazone" panose="020B0603050302020204" pitchFamily="34" charset="0"/>
-              </a:defRPr>
-            </a:lvl1pPr>
-          </a:lstStyle>
-          <a:p>
-            <a:r>
-              <a:rPr lang="en-US"/>
-              <a:t>Tc 20 – Ngôïi Khen Ñaáng Quaân Laâm Muoân Ñôøi</a:t>
-            </a:r>
-          </a:p>
-        </p:txBody>
-      </p:sp>
     </p:spTree>
     <p:extLst>
       <p:ext uri="{BB962C8B-B14F-4D97-AF65-F5344CB8AC3E}">
@@ -2683,21 +2293,6 @@
   <p:clrMapOvr>
     <a:masterClrMapping/>
   </p:clrMapOvr>
-  <mc:AlternateContent xmlns:mc="http://schemas.openxmlformats.org/markup-compatibility/2006" xmlns:p14="http://schemas.microsoft.com/office/powerpoint/2010/main">
-    <mc:Choice Requires="p14">
-      <p:transition p14:dur="0"/>
-    </mc:Choice>
-    <mc:Fallback xmlns="">
-      <p:transition/>
-    </mc:Fallback>
-  </mc:AlternateContent>
-  <p:timing>
-    <p:tnLst>
-      <p:par>
-        <p:cTn id="1" dur="indefinite" restart="never" nodeType="tmRoot"/>
-      </p:par>
-    </p:tnLst>
-  </p:timing>
 </p:sld>
 </file>
 
@@ -2763,65 +2358,7 @@
             </a:r>
             <a:r>
               <a:rPr lang="en-US"/>
-              <a:t> Ñoàng ngôïi danh Jeâsus, toân kính danh Jeâsus, ñoàng ngôïi khen danh </a:t>
-            </a:r>
-            <a:r>
-              <a:rPr lang="en-US" smtClean="0"/>
-              <a:t>Cöùu </a:t>
-            </a:r>
-            <a:r>
-              <a:rPr lang="en-US"/>
-              <a:t>Chuùa Jeâsus.</a:t>
-            </a:r>
-          </a:p>
-        </p:txBody>
-      </p:sp>
-      <p:sp>
-        <p:nvSpPr>
-          <p:cNvPr id="6" name="Title 1"/>
-          <p:cNvSpPr txBox="1">
-            <a:spLocks/>
-          </p:cNvSpPr>
-          <p:nvPr/>
-        </p:nvSpPr>
-        <p:spPr>
-          <a:xfrm>
-            <a:off x="0" y="5943600"/>
-            <a:ext cx="9144000" cy="685800"/>
-          </a:xfrm>
-          <a:prstGeom prst="rect">
-            <a:avLst/>
-          </a:prstGeom>
-        </p:spPr>
-        <p:txBody>
-          <a:bodyPr vert="horz" lIns="91440" tIns="45720" rIns="91440" bIns="45720" rtlCol="0" anchor="ctr">
-            <a:noAutofit/>
-          </a:bodyPr>
-          <a:lstStyle>
-            <a:defPPr>
-              <a:defRPr lang="en-US"/>
-            </a:defPPr>
-            <a:lvl1pPr algn="ctr">
-              <a:spcBef>
-                <a:spcPct val="0"/>
-              </a:spcBef>
-              <a:defRPr sz="3600" b="1" spc="-150">
-                <a:solidFill>
-                  <a:srgbClr val="C00000"/>
-                </a:solidFill>
-                <a:effectLst>
-                  <a:glow rad="127000">
-                    <a:prstClr val="white"/>
-                  </a:glow>
-                </a:effectLst>
-                <a:latin typeface="HP-Amazone" panose="020B0603050302020204" pitchFamily="34" charset="0"/>
-              </a:defRPr>
-            </a:lvl1pPr>
-          </a:lstStyle>
-          <a:p>
-            <a:r>
-              <a:rPr lang="en-US"/>
-              <a:t>Tc 20 – Ngôïi Khen Ñaáng Quaân Laâm Muoân Ñôøi</a:t>
+              <a:t> Ñoàng ngôïi danh Jeâsus, toân kính danh Jeâsus, ñoàng ngôïi khen danh Cöùu Chuùa Jeâsus.</a:t>
             </a:r>
           </a:p>
         </p:txBody>
@@ -2836,21 +2373,6 @@
   <p:clrMapOvr>
     <a:masterClrMapping/>
   </p:clrMapOvr>
-  <mc:AlternateContent xmlns:mc="http://schemas.openxmlformats.org/markup-compatibility/2006" xmlns:p14="http://schemas.microsoft.com/office/powerpoint/2010/main">
-    <mc:Choice Requires="p14">
-      <p:transition p14:dur="0"/>
-    </mc:Choice>
-    <mc:Fallback xmlns="">
-      <p:transition/>
-    </mc:Fallback>
-  </mc:AlternateContent>
-  <p:timing>
-    <p:tnLst>
-      <p:par>
-        <p:cTn id="1" dur="indefinite" restart="never" nodeType="tmRoot"/>
-      </p:par>
-    </p:tnLst>
-  </p:timing>
 </p:sld>
 </file>
 
@@ -2924,56 +2446,6 @@
           </a:p>
         </p:txBody>
       </p:sp>
-      <p:sp>
-        <p:nvSpPr>
-          <p:cNvPr id="6" name="Title 1"/>
-          <p:cNvSpPr txBox="1">
-            <a:spLocks/>
-          </p:cNvSpPr>
-          <p:nvPr/>
-        </p:nvSpPr>
-        <p:spPr>
-          <a:xfrm>
-            <a:off x="0" y="5943600"/>
-            <a:ext cx="9144000" cy="685800"/>
-          </a:xfrm>
-          <a:prstGeom prst="rect">
-            <a:avLst/>
-          </a:prstGeom>
-        </p:spPr>
-        <p:txBody>
-          <a:bodyPr vert="horz" lIns="91440" tIns="45720" rIns="91440" bIns="45720" rtlCol="0" anchor="ctr">
-            <a:noAutofit/>
-          </a:bodyPr>
-          <a:lstStyle>
-            <a:defPPr>
-              <a:defRPr lang="en-US"/>
-            </a:defPPr>
-            <a:lvl1pPr algn="ctr">
-              <a:spcBef>
-                <a:spcPct val="0"/>
-              </a:spcBef>
-              <a:defRPr sz="3600" b="1" spc="-150">
-                <a:solidFill>
-                  <a:srgbClr val="C00000"/>
-                </a:solidFill>
-                <a:effectLst>
-                  <a:glow rad="127000">
-                    <a:prstClr val="white"/>
-                  </a:glow>
-                </a:effectLst>
-                <a:latin typeface="HP-Amazone" panose="020B0603050302020204" pitchFamily="34" charset="0"/>
-              </a:defRPr>
-            </a:lvl1pPr>
-          </a:lstStyle>
-          <a:p>
-            <a:r>
-              <a:rPr lang="en-US"/>
-              <a:t>Tc 20 – Ngôïi Khen Ñaáng Quaân Laâm Muoân Ñôøi</a:t>
-            </a:r>
-          </a:p>
-        </p:txBody>
-      </p:sp>
     </p:spTree>
     <p:extLst>
       <p:ext uri="{BB962C8B-B14F-4D97-AF65-F5344CB8AC3E}">
@@ -2984,21 +2456,6 @@
   <p:clrMapOvr>
     <a:masterClrMapping/>
   </p:clrMapOvr>
-  <mc:AlternateContent xmlns:mc="http://schemas.openxmlformats.org/markup-compatibility/2006" xmlns:p14="http://schemas.microsoft.com/office/powerpoint/2010/main">
-    <mc:Choice Requires="p14">
-      <p:transition p14:dur="0"/>
-    </mc:Choice>
-    <mc:Fallback xmlns="">
-      <p:transition/>
-    </mc:Fallback>
-  </mc:AlternateContent>
-  <p:timing>
-    <p:tnLst>
-      <p:par>
-        <p:cTn id="1" dur="indefinite" restart="never" nodeType="tmRoot"/>
-      </p:par>
-    </p:tnLst>
-  </p:timing>
 </p:sld>
 </file>
 
@@ -3019,56 +2476,6 @@
           <a:chExt cx="0" cy="0"/>
         </a:xfrm>
       </p:grpSpPr>
-      <p:sp>
-        <p:nvSpPr>
-          <p:cNvPr id="4" name="Title 1"/>
-          <p:cNvSpPr txBox="1">
-            <a:spLocks/>
-          </p:cNvSpPr>
-          <p:nvPr/>
-        </p:nvSpPr>
-        <p:spPr>
-          <a:xfrm>
-            <a:off x="0" y="5943600"/>
-            <a:ext cx="9144000" cy="685800"/>
-          </a:xfrm>
-          <a:prstGeom prst="rect">
-            <a:avLst/>
-          </a:prstGeom>
-        </p:spPr>
-        <p:txBody>
-          <a:bodyPr vert="horz" lIns="91440" tIns="45720" rIns="91440" bIns="45720" rtlCol="0" anchor="ctr">
-            <a:noAutofit/>
-          </a:bodyPr>
-          <a:lstStyle>
-            <a:defPPr>
-              <a:defRPr lang="en-US"/>
-            </a:defPPr>
-            <a:lvl1pPr algn="ctr">
-              <a:spcBef>
-                <a:spcPct val="0"/>
-              </a:spcBef>
-              <a:defRPr sz="3600" b="1" spc="-150">
-                <a:solidFill>
-                  <a:srgbClr val="C00000"/>
-                </a:solidFill>
-                <a:effectLst>
-                  <a:glow rad="127000">
-                    <a:prstClr val="white"/>
-                  </a:glow>
-                </a:effectLst>
-                <a:latin typeface="HP-Amazone" panose="020B0603050302020204" pitchFamily="34" charset="0"/>
-              </a:defRPr>
-            </a:lvl1pPr>
-          </a:lstStyle>
-          <a:p>
-            <a:r>
-              <a:rPr lang="en-US"/>
-              <a:t>Tc 20 – Ngôïi Khen Ñaáng Quaân Laâm Muoân Ñôøi</a:t>
-            </a:r>
-          </a:p>
-        </p:txBody>
-      </p:sp>
       <p:sp>
         <p:nvSpPr>
           <p:cNvPr id="5" name="TextBox 4"/>
@@ -3146,13 +2553,6 @@
   <p:transition spd="slow">
     <p:randomBar dir="vert"/>
   </p:transition>
-  <p:timing>
-    <p:tnLst>
-      <p:par>
-        <p:cTn id="1" dur="indefinite" restart="never" nodeType="tmRoot"/>
-      </p:par>
-    </p:tnLst>
-  </p:timing>
 </p:sld>
 </file>
 
@@ -3233,56 +2633,6 @@
           </a:p>
         </p:txBody>
       </p:sp>
-      <p:sp>
-        <p:nvSpPr>
-          <p:cNvPr id="4" name="Title 1"/>
-          <p:cNvSpPr txBox="1">
-            <a:spLocks/>
-          </p:cNvSpPr>
-          <p:nvPr/>
-        </p:nvSpPr>
-        <p:spPr>
-          <a:xfrm>
-            <a:off x="0" y="5943600"/>
-            <a:ext cx="9144000" cy="685800"/>
-          </a:xfrm>
-          <a:prstGeom prst="rect">
-            <a:avLst/>
-          </a:prstGeom>
-        </p:spPr>
-        <p:txBody>
-          <a:bodyPr vert="horz" lIns="91440" tIns="45720" rIns="91440" bIns="45720" rtlCol="0" anchor="ctr">
-            <a:noAutofit/>
-          </a:bodyPr>
-          <a:lstStyle>
-            <a:defPPr>
-              <a:defRPr lang="en-US"/>
-            </a:defPPr>
-            <a:lvl1pPr algn="ctr">
-              <a:spcBef>
-                <a:spcPct val="0"/>
-              </a:spcBef>
-              <a:defRPr sz="3600" b="1" spc="-150">
-                <a:solidFill>
-                  <a:srgbClr val="C00000"/>
-                </a:solidFill>
-                <a:effectLst>
-                  <a:glow rad="127000">
-                    <a:prstClr val="white"/>
-                  </a:glow>
-                </a:effectLst>
-                <a:latin typeface="HP-Amazone" panose="020B0603050302020204" pitchFamily="34" charset="0"/>
-              </a:defRPr>
-            </a:lvl1pPr>
-          </a:lstStyle>
-          <a:p>
-            <a:r>
-              <a:rPr lang="en-US"/>
-              <a:t>Tc 20 – Ngôïi Khen Ñaáng Quaân Laâm Muoân Ñôøi</a:t>
-            </a:r>
-          </a:p>
-        </p:txBody>
-      </p:sp>
     </p:spTree>
     <p:extLst>
       <p:ext uri="{BB962C8B-B14F-4D97-AF65-F5344CB8AC3E}">
@@ -3293,21 +2643,6 @@
   <p:clrMapOvr>
     <a:masterClrMapping/>
   </p:clrMapOvr>
-  <mc:AlternateContent xmlns:mc="http://schemas.openxmlformats.org/markup-compatibility/2006" xmlns:p14="http://schemas.microsoft.com/office/powerpoint/2010/main">
-    <mc:Choice Requires="p14">
-      <p:transition p14:dur="0"/>
-    </mc:Choice>
-    <mc:Fallback xmlns="">
-      <p:transition/>
-    </mc:Fallback>
-  </mc:AlternateContent>
-  <p:timing>
-    <p:tnLst>
-      <p:par>
-        <p:cTn id="1" dur="indefinite" restart="never" nodeType="tmRoot"/>
-      </p:par>
-    </p:tnLst>
-  </p:timing>
 </p:sld>
 </file>
 
@@ -3373,65 +2708,7 @@
             </a:r>
             <a:r>
               <a:rPr lang="en-US"/>
-              <a:t> Ñoàng ngôïi danh Jeâsus, toân kính danh Jeâsus, ñoàng ngôïi khen danh </a:t>
-            </a:r>
-            <a:r>
-              <a:rPr lang="en-US" smtClean="0"/>
-              <a:t>Cöùu </a:t>
-            </a:r>
-            <a:r>
-              <a:rPr lang="en-US"/>
-              <a:t>Chuùa Jeâsus.</a:t>
-            </a:r>
-          </a:p>
-        </p:txBody>
-      </p:sp>
-      <p:sp>
-        <p:nvSpPr>
-          <p:cNvPr id="6" name="Title 1"/>
-          <p:cNvSpPr txBox="1">
-            <a:spLocks/>
-          </p:cNvSpPr>
-          <p:nvPr/>
-        </p:nvSpPr>
-        <p:spPr>
-          <a:xfrm>
-            <a:off x="0" y="5943600"/>
-            <a:ext cx="9144000" cy="685800"/>
-          </a:xfrm>
-          <a:prstGeom prst="rect">
-            <a:avLst/>
-          </a:prstGeom>
-        </p:spPr>
-        <p:txBody>
-          <a:bodyPr vert="horz" lIns="91440" tIns="45720" rIns="91440" bIns="45720" rtlCol="0" anchor="ctr">
-            <a:noAutofit/>
-          </a:bodyPr>
-          <a:lstStyle>
-            <a:defPPr>
-              <a:defRPr lang="en-US"/>
-            </a:defPPr>
-            <a:lvl1pPr algn="ctr">
-              <a:spcBef>
-                <a:spcPct val="0"/>
-              </a:spcBef>
-              <a:defRPr sz="3600" b="1" spc="-150">
-                <a:solidFill>
-                  <a:srgbClr val="C00000"/>
-                </a:solidFill>
-                <a:effectLst>
-                  <a:glow rad="127000">
-                    <a:prstClr val="white"/>
-                  </a:glow>
-                </a:effectLst>
-                <a:latin typeface="HP-Amazone" panose="020B0603050302020204" pitchFamily="34" charset="0"/>
-              </a:defRPr>
-            </a:lvl1pPr>
-          </a:lstStyle>
-          <a:p>
-            <a:r>
-              <a:rPr lang="en-US"/>
-              <a:t>Tc 20 – Ngôïi Khen Ñaáng Quaân Laâm Muoân Ñôøi</a:t>
+              <a:t> Ñoàng ngôïi danh Jeâsus, toân kính danh Jeâsus, ñoàng ngôïi khen danh Cöùu Chuùa Jeâsus.</a:t>
             </a:r>
           </a:p>
         </p:txBody>
@@ -3446,21 +2723,6 @@
   <p:clrMapOvr>
     <a:masterClrMapping/>
   </p:clrMapOvr>
-  <mc:AlternateContent xmlns:mc="http://schemas.openxmlformats.org/markup-compatibility/2006" xmlns:p14="http://schemas.microsoft.com/office/powerpoint/2010/main">
-    <mc:Choice Requires="p14">
-      <p:transition p14:dur="0"/>
-    </mc:Choice>
-    <mc:Fallback xmlns="">
-      <p:transition/>
-    </mc:Fallback>
-  </mc:AlternateContent>
-  <p:timing>
-    <p:tnLst>
-      <p:par>
-        <p:cTn id="1" dur="indefinite" restart="never" nodeType="tmRoot"/>
-      </p:par>
-    </p:tnLst>
-  </p:timing>
 </p:sld>
 </file>
 
@@ -3534,56 +2796,6 @@
           </a:p>
         </p:txBody>
       </p:sp>
-      <p:sp>
-        <p:nvSpPr>
-          <p:cNvPr id="6" name="Title 1"/>
-          <p:cNvSpPr txBox="1">
-            <a:spLocks/>
-          </p:cNvSpPr>
-          <p:nvPr/>
-        </p:nvSpPr>
-        <p:spPr>
-          <a:xfrm>
-            <a:off x="0" y="5943600"/>
-            <a:ext cx="9144000" cy="685800"/>
-          </a:xfrm>
-          <a:prstGeom prst="rect">
-            <a:avLst/>
-          </a:prstGeom>
-        </p:spPr>
-        <p:txBody>
-          <a:bodyPr vert="horz" lIns="91440" tIns="45720" rIns="91440" bIns="45720" rtlCol="0" anchor="ctr">
-            <a:noAutofit/>
-          </a:bodyPr>
-          <a:lstStyle>
-            <a:defPPr>
-              <a:defRPr lang="en-US"/>
-            </a:defPPr>
-            <a:lvl1pPr algn="ctr">
-              <a:spcBef>
-                <a:spcPct val="0"/>
-              </a:spcBef>
-              <a:defRPr sz="3600" b="1" spc="-150">
-                <a:solidFill>
-                  <a:srgbClr val="C00000"/>
-                </a:solidFill>
-                <a:effectLst>
-                  <a:glow rad="127000">
-                    <a:prstClr val="white"/>
-                  </a:glow>
-                </a:effectLst>
-                <a:latin typeface="HP-Amazone" panose="020B0603050302020204" pitchFamily="34" charset="0"/>
-              </a:defRPr>
-            </a:lvl1pPr>
-          </a:lstStyle>
-          <a:p>
-            <a:r>
-              <a:rPr lang="en-US"/>
-              <a:t>Tc 20 – Ngôïi Khen Ñaáng Quaân Laâm Muoân Ñôøi</a:t>
-            </a:r>
-          </a:p>
-        </p:txBody>
-      </p:sp>
     </p:spTree>
     <p:extLst>
       <p:ext uri="{BB962C8B-B14F-4D97-AF65-F5344CB8AC3E}">
@@ -3594,21 +2806,6 @@
   <p:clrMapOvr>
     <a:masterClrMapping/>
   </p:clrMapOvr>
-  <mc:AlternateContent xmlns:mc="http://schemas.openxmlformats.org/markup-compatibility/2006" xmlns:p14="http://schemas.microsoft.com/office/powerpoint/2010/main">
-    <mc:Choice Requires="p14">
-      <p:transition p14:dur="0"/>
-    </mc:Choice>
-    <mc:Fallback xmlns="">
-      <p:transition/>
-    </mc:Fallback>
-  </mc:AlternateContent>
-  <p:timing>
-    <p:tnLst>
-      <p:par>
-        <p:cTn id="1" dur="indefinite" restart="never" nodeType="tmRoot"/>
-      </p:par>
-    </p:tnLst>
-  </p:timing>
 </p:sld>
 </file>
 
@@ -3686,56 +2883,6 @@
           </a:p>
         </p:txBody>
       </p:sp>
-      <p:sp>
-        <p:nvSpPr>
-          <p:cNvPr id="6" name="Title 1"/>
-          <p:cNvSpPr txBox="1">
-            <a:spLocks/>
-          </p:cNvSpPr>
-          <p:nvPr/>
-        </p:nvSpPr>
-        <p:spPr>
-          <a:xfrm>
-            <a:off x="0" y="5943600"/>
-            <a:ext cx="9144000" cy="685800"/>
-          </a:xfrm>
-          <a:prstGeom prst="rect">
-            <a:avLst/>
-          </a:prstGeom>
-        </p:spPr>
-        <p:txBody>
-          <a:bodyPr vert="horz" lIns="91440" tIns="45720" rIns="91440" bIns="45720" rtlCol="0" anchor="ctr">
-            <a:noAutofit/>
-          </a:bodyPr>
-          <a:lstStyle>
-            <a:defPPr>
-              <a:defRPr lang="en-US"/>
-            </a:defPPr>
-            <a:lvl1pPr algn="ctr">
-              <a:spcBef>
-                <a:spcPct val="0"/>
-              </a:spcBef>
-              <a:defRPr sz="3600" b="1" spc="-150">
-                <a:solidFill>
-                  <a:srgbClr val="C00000"/>
-                </a:solidFill>
-                <a:effectLst>
-                  <a:glow rad="127000">
-                    <a:prstClr val="white"/>
-                  </a:glow>
-                </a:effectLst>
-                <a:latin typeface="HP-Amazone" panose="020B0603050302020204" pitchFamily="34" charset="0"/>
-              </a:defRPr>
-            </a:lvl1pPr>
-          </a:lstStyle>
-          <a:p>
-            <a:r>
-              <a:rPr lang="en-US"/>
-              <a:t>Tc 20 – Ngôïi Khen Ñaáng Quaân Laâm Muoân Ñôøi</a:t>
-            </a:r>
-          </a:p>
-        </p:txBody>
-      </p:sp>
     </p:spTree>
     <p:extLst>
       <p:ext uri="{BB962C8B-B14F-4D97-AF65-F5344CB8AC3E}">
@@ -3746,21 +2893,6 @@
   <p:clrMapOvr>
     <a:masterClrMapping/>
   </p:clrMapOvr>
-  <mc:AlternateContent xmlns:mc="http://schemas.openxmlformats.org/markup-compatibility/2006" xmlns:p14="http://schemas.microsoft.com/office/powerpoint/2010/main">
-    <mc:Choice Requires="p14">
-      <p:transition p14:dur="0"/>
-    </mc:Choice>
-    <mc:Fallback xmlns="">
-      <p:transition/>
-    </mc:Fallback>
-  </mc:AlternateContent>
-  <p:timing>
-    <p:tnLst>
-      <p:par>
-        <p:cTn id="1" dur="indefinite" restart="never" nodeType="tmRoot"/>
-      </p:par>
-    </p:tnLst>
-  </p:timing>
 </p:sld>
 </file>
 
@@ -3841,56 +2973,6 @@
           </a:p>
         </p:txBody>
       </p:sp>
-      <p:sp>
-        <p:nvSpPr>
-          <p:cNvPr id="6" name="Title 1"/>
-          <p:cNvSpPr txBox="1">
-            <a:spLocks/>
-          </p:cNvSpPr>
-          <p:nvPr/>
-        </p:nvSpPr>
-        <p:spPr>
-          <a:xfrm>
-            <a:off x="0" y="5943600"/>
-            <a:ext cx="9144000" cy="685800"/>
-          </a:xfrm>
-          <a:prstGeom prst="rect">
-            <a:avLst/>
-          </a:prstGeom>
-        </p:spPr>
-        <p:txBody>
-          <a:bodyPr vert="horz" lIns="91440" tIns="45720" rIns="91440" bIns="45720" rtlCol="0" anchor="ctr">
-            <a:noAutofit/>
-          </a:bodyPr>
-          <a:lstStyle>
-            <a:defPPr>
-              <a:defRPr lang="en-US"/>
-            </a:defPPr>
-            <a:lvl1pPr algn="ctr">
-              <a:spcBef>
-                <a:spcPct val="0"/>
-              </a:spcBef>
-              <a:defRPr sz="3600" b="1" spc="-150">
-                <a:solidFill>
-                  <a:srgbClr val="C00000"/>
-                </a:solidFill>
-                <a:effectLst>
-                  <a:glow rad="127000">
-                    <a:prstClr val="white"/>
-                  </a:glow>
-                </a:effectLst>
-                <a:latin typeface="HP-Amazone" panose="020B0603050302020204" pitchFamily="34" charset="0"/>
-              </a:defRPr>
-            </a:lvl1pPr>
-          </a:lstStyle>
-          <a:p>
-            <a:r>
-              <a:rPr lang="en-US"/>
-              <a:t>Tc 20 – Ngôïi Khen Ñaáng Quaân Laâm Muoân Ñôøi</a:t>
-            </a:r>
-          </a:p>
-        </p:txBody>
-      </p:sp>
     </p:spTree>
     <p:extLst>
       <p:ext uri="{BB962C8B-B14F-4D97-AF65-F5344CB8AC3E}">
@@ -3901,21 +2983,6 @@
   <p:clrMapOvr>
     <a:masterClrMapping/>
   </p:clrMapOvr>
-  <mc:AlternateContent xmlns:mc="http://schemas.openxmlformats.org/markup-compatibility/2006" xmlns:p14="http://schemas.microsoft.com/office/powerpoint/2010/main">
-    <mc:Choice Requires="p14">
-      <p:transition p14:dur="0"/>
-    </mc:Choice>
-    <mc:Fallback xmlns="">
-      <p:transition/>
-    </mc:Fallback>
-  </mc:AlternateContent>
-  <p:timing>
-    <p:tnLst>
-      <p:par>
-        <p:cTn id="1" dur="indefinite" restart="never" nodeType="tmRoot"/>
-      </p:par>
-    </p:tnLst>
-  </p:timing>
 </p:sld>
 </file>
 
@@ -3981,65 +3048,7 @@
             </a:r>
             <a:r>
               <a:rPr lang="en-US"/>
-              <a:t> Ñoàng ngôïi danh Jeâsus, toân kính danh Jeâsus, ñoàng ngôïi khen danh </a:t>
-            </a:r>
-            <a:r>
-              <a:rPr lang="en-US" smtClean="0"/>
-              <a:t>Cöùu </a:t>
-            </a:r>
-            <a:r>
-              <a:rPr lang="en-US"/>
-              <a:t>Chuùa Jeâsus.</a:t>
-            </a:r>
-          </a:p>
-        </p:txBody>
-      </p:sp>
-      <p:sp>
-        <p:nvSpPr>
-          <p:cNvPr id="6" name="Title 1"/>
-          <p:cNvSpPr txBox="1">
-            <a:spLocks/>
-          </p:cNvSpPr>
-          <p:nvPr/>
-        </p:nvSpPr>
-        <p:spPr>
-          <a:xfrm>
-            <a:off x="0" y="5943600"/>
-            <a:ext cx="9144000" cy="685800"/>
-          </a:xfrm>
-          <a:prstGeom prst="rect">
-            <a:avLst/>
-          </a:prstGeom>
-        </p:spPr>
-        <p:txBody>
-          <a:bodyPr vert="horz" lIns="91440" tIns="45720" rIns="91440" bIns="45720" rtlCol="0" anchor="ctr">
-            <a:noAutofit/>
-          </a:bodyPr>
-          <a:lstStyle>
-            <a:defPPr>
-              <a:defRPr lang="en-US"/>
-            </a:defPPr>
-            <a:lvl1pPr algn="ctr">
-              <a:spcBef>
-                <a:spcPct val="0"/>
-              </a:spcBef>
-              <a:defRPr sz="3600" b="1" spc="-150">
-                <a:solidFill>
-                  <a:srgbClr val="C00000"/>
-                </a:solidFill>
-                <a:effectLst>
-                  <a:glow rad="127000">
-                    <a:prstClr val="white"/>
-                  </a:glow>
-                </a:effectLst>
-                <a:latin typeface="HP-Amazone" panose="020B0603050302020204" pitchFamily="34" charset="0"/>
-              </a:defRPr>
-            </a:lvl1pPr>
-          </a:lstStyle>
-          <a:p>
-            <a:r>
-              <a:rPr lang="en-US"/>
-              <a:t>Tc 20 – Ngôïi Khen Ñaáng Quaân Laâm Muoân Ñôøi</a:t>
+              <a:t> Ñoàng ngôïi danh Jeâsus, toân kính danh Jeâsus, ñoàng ngôïi khen danh Cöùu Chuùa Jeâsus.</a:t>
             </a:r>
           </a:p>
         </p:txBody>
@@ -4054,21 +3063,6 @@
   <p:clrMapOvr>
     <a:masterClrMapping/>
   </p:clrMapOvr>
-  <mc:AlternateContent xmlns:mc="http://schemas.openxmlformats.org/markup-compatibility/2006" xmlns:p14="http://schemas.microsoft.com/office/powerpoint/2010/main">
-    <mc:Choice Requires="p14">
-      <p:transition p14:dur="0"/>
-    </mc:Choice>
-    <mc:Fallback xmlns="">
-      <p:transition/>
-    </mc:Fallback>
-  </mc:AlternateContent>
-  <p:timing>
-    <p:tnLst>
-      <p:par>
-        <p:cTn id="1" dur="indefinite" restart="never" nodeType="tmRoot"/>
-      </p:par>
-    </p:tnLst>
-  </p:timing>
 </p:sld>
 </file>
 
@@ -4142,56 +3136,6 @@
           </a:p>
         </p:txBody>
       </p:sp>
-      <p:sp>
-        <p:nvSpPr>
-          <p:cNvPr id="6" name="Title 1"/>
-          <p:cNvSpPr txBox="1">
-            <a:spLocks/>
-          </p:cNvSpPr>
-          <p:nvPr/>
-        </p:nvSpPr>
-        <p:spPr>
-          <a:xfrm>
-            <a:off x="0" y="5943600"/>
-            <a:ext cx="9144000" cy="685800"/>
-          </a:xfrm>
-          <a:prstGeom prst="rect">
-            <a:avLst/>
-          </a:prstGeom>
-        </p:spPr>
-        <p:txBody>
-          <a:bodyPr vert="horz" lIns="91440" tIns="45720" rIns="91440" bIns="45720" rtlCol="0" anchor="ctr">
-            <a:noAutofit/>
-          </a:bodyPr>
-          <a:lstStyle>
-            <a:defPPr>
-              <a:defRPr lang="en-US"/>
-            </a:defPPr>
-            <a:lvl1pPr algn="ctr">
-              <a:spcBef>
-                <a:spcPct val="0"/>
-              </a:spcBef>
-              <a:defRPr sz="3600" b="1" spc="-150">
-                <a:solidFill>
-                  <a:srgbClr val="C00000"/>
-                </a:solidFill>
-                <a:effectLst>
-                  <a:glow rad="127000">
-                    <a:prstClr val="white"/>
-                  </a:glow>
-                </a:effectLst>
-                <a:latin typeface="HP-Amazone" panose="020B0603050302020204" pitchFamily="34" charset="0"/>
-              </a:defRPr>
-            </a:lvl1pPr>
-          </a:lstStyle>
-          <a:p>
-            <a:r>
-              <a:rPr lang="en-US"/>
-              <a:t>Tc 20 – Ngôïi Khen Ñaáng Quaân Laâm Muoân Ñôøi</a:t>
-            </a:r>
-          </a:p>
-        </p:txBody>
-      </p:sp>
     </p:spTree>
     <p:extLst>
       <p:ext uri="{BB962C8B-B14F-4D97-AF65-F5344CB8AC3E}">
@@ -4202,21 +3146,6 @@
   <p:clrMapOvr>
     <a:masterClrMapping/>
   </p:clrMapOvr>
-  <mc:AlternateContent xmlns:mc="http://schemas.openxmlformats.org/markup-compatibility/2006" xmlns:p14="http://schemas.microsoft.com/office/powerpoint/2010/main">
-    <mc:Choice Requires="p14">
-      <p:transition p14:dur="0"/>
-    </mc:Choice>
-    <mc:Fallback xmlns="">
-      <p:transition/>
-    </mc:Fallback>
-  </mc:AlternateContent>
-  <p:timing>
-    <p:tnLst>
-      <p:par>
-        <p:cTn id="1" dur="indefinite" restart="never" nodeType="tmRoot"/>
-      </p:par>
-    </p:tnLst>
-  </p:timing>
 </p:sld>
 </file>
 

</xml_diff>